<commit_message>
HTML5 goals and storage diff
</commit_message>
<xml_diff>
--- a/HTML5.pptx
+++ b/HTML5.pptx
@@ -7,16 +7,18 @@
   <p:sldIdLst>
     <p:sldId id="256" r:id="rId2"/>
     <p:sldId id="257" r:id="rId3"/>
-    <p:sldId id="271" r:id="rId4"/>
-    <p:sldId id="270" r:id="rId5"/>
-    <p:sldId id="272" r:id="rId6"/>
-    <p:sldId id="273" r:id="rId7"/>
-    <p:sldId id="274" r:id="rId8"/>
-    <p:sldId id="275" r:id="rId9"/>
-    <p:sldId id="276" r:id="rId10"/>
-    <p:sldId id="278" r:id="rId11"/>
-    <p:sldId id="277" r:id="rId12"/>
-    <p:sldId id="269" r:id="rId13"/>
+    <p:sldId id="279" r:id="rId4"/>
+    <p:sldId id="271" r:id="rId5"/>
+    <p:sldId id="270" r:id="rId6"/>
+    <p:sldId id="272" r:id="rId7"/>
+    <p:sldId id="273" r:id="rId8"/>
+    <p:sldId id="274" r:id="rId9"/>
+    <p:sldId id="275" r:id="rId10"/>
+    <p:sldId id="280" r:id="rId11"/>
+    <p:sldId id="276" r:id="rId12"/>
+    <p:sldId id="278" r:id="rId13"/>
+    <p:sldId id="277" r:id="rId14"/>
+    <p:sldId id="269" r:id="rId15"/>
   </p:sldIdLst>
   <p:sldSz cx="9144000" cy="6858000" type="screen4x3"/>
   <p:notesSz cx="6858000" cy="9144000"/>
@@ -3467,7 +3469,19 @@
           <a:p>
             <a:r>
               <a:rPr lang="en-US" dirty="0" smtClean="0"/>
-              <a:t>HTML5 – Application Cache</a:t>
+              <a:t>HTML5 – </a:t>
+            </a:r>
+            <a:r>
+              <a:rPr lang="en-US" dirty="0" smtClean="0"/>
+              <a:t>Session</a:t>
+            </a:r>
+            <a:r>
+              <a:rPr lang="en-US" dirty="0" smtClean="0"/>
+              <a:t> </a:t>
+            </a:r>
+            <a:r>
+              <a:rPr lang="en-US" dirty="0" smtClean="0"/>
+              <a:t>Vs Local Storage</a:t>
             </a:r>
             <a:endParaRPr lang="en-US" dirty="0"/>
           </a:p>
@@ -3491,121 +3505,399 @@
           <a:lstStyle/>
           <a:p>
             <a:r>
-              <a:rPr lang="en-GB" sz="1600" dirty="0" smtClean="0"/>
-              <a:t>Application cache enables us to make an offline version of a web application i.e. </a:t>
-            </a:r>
-            <a:r>
-              <a:rPr lang="en-GB" sz="1600" b="1" dirty="0" smtClean="0"/>
-              <a:t>offline browsing</a:t>
-            </a:r>
-          </a:p>
-          <a:p>
-            <a:r>
-              <a:rPr lang="en-GB" sz="1600" dirty="0" smtClean="0"/>
-              <a:t>Fetches few or all of website contents such as HTML files, CSS, images, JavaScript etc. locally</a:t>
-            </a:r>
-          </a:p>
-          <a:p>
-            <a:r>
-              <a:rPr lang="en-GB" sz="1600" dirty="0" smtClean="0"/>
-              <a:t>Speeds up the site performance</a:t>
-            </a:r>
-          </a:p>
-          <a:p>
-            <a:r>
-              <a:rPr lang="en-GB" sz="1600" dirty="0" smtClean="0"/>
-              <a:t>Achieved with the help of a manifest file </a:t>
-            </a:r>
-          </a:p>
-          <a:p>
-            <a:pPr lvl="1"/>
-            <a:r>
-              <a:rPr lang="en-US" sz="1400" dirty="0"/>
-              <a:t>&lt;html manifest="demo.appcache</a:t>
-            </a:r>
-            <a:r>
-              <a:rPr lang="en-US" sz="1400" dirty="0" smtClean="0"/>
-              <a:t>"&gt;</a:t>
-            </a:r>
-          </a:p>
-          <a:p>
-            <a:r>
-              <a:rPr lang="en-US" sz="1600" dirty="0" smtClean="0"/>
-              <a:t>Manifest file is a simple text file,</a:t>
-            </a:r>
-            <a:r>
-              <a:rPr lang="en-GB" sz="1600" dirty="0"/>
-              <a:t> which tells the browser what to </a:t>
-            </a:r>
-            <a:r>
-              <a:rPr lang="en-GB" sz="1600" dirty="0" smtClean="0"/>
-              <a:t>cache</a:t>
-            </a:r>
-          </a:p>
-          <a:p>
-            <a:r>
-              <a:rPr lang="en-GB" sz="1600" dirty="0"/>
-              <a:t>The manifest file has three sections</a:t>
-            </a:r>
-            <a:r>
-              <a:rPr lang="en-GB" sz="1600" dirty="0" smtClean="0"/>
-              <a:t>:</a:t>
-            </a:r>
-          </a:p>
-          <a:p>
-            <a:pPr lvl="1"/>
-            <a:r>
-              <a:rPr lang="en-GB" sz="1400" b="1" dirty="0" smtClean="0"/>
-              <a:t>CACHE MANIFEST </a:t>
-            </a:r>
-            <a:r>
-              <a:rPr lang="en-GB" sz="1400" dirty="0" smtClean="0"/>
-              <a:t>- </a:t>
-            </a:r>
-            <a:r>
-              <a:rPr lang="en-GB" sz="1400" dirty="0"/>
-              <a:t>Files listed under this header will be cached after they are downloaded for the first time</a:t>
-            </a:r>
-            <a:endParaRPr lang="en-GB" sz="1400" dirty="0" smtClean="0"/>
-          </a:p>
-          <a:p>
-            <a:pPr lvl="1"/>
-            <a:r>
-              <a:rPr lang="en-GB" sz="1400" b="1" dirty="0" smtClean="0"/>
-              <a:t>NETWORK</a:t>
-            </a:r>
-            <a:r>
-              <a:rPr lang="en-GB" sz="1400" dirty="0" smtClean="0"/>
-              <a:t> - </a:t>
-            </a:r>
-            <a:r>
-              <a:rPr lang="en-GB" sz="1400" dirty="0"/>
-              <a:t>Files listed under this header require a connection to the server, and will never be cached</a:t>
-            </a:r>
-            <a:endParaRPr lang="en-GB" sz="1400" dirty="0" smtClean="0"/>
-          </a:p>
-          <a:p>
-            <a:pPr lvl="1"/>
-            <a:r>
-              <a:rPr lang="en-GB" sz="1400" b="1" dirty="0" smtClean="0"/>
-              <a:t>FALLBACK</a:t>
-            </a:r>
-            <a:r>
-              <a:rPr lang="en-GB" sz="1400" dirty="0" smtClean="0"/>
-              <a:t> - </a:t>
-            </a:r>
-            <a:r>
-              <a:rPr lang="en-GB" sz="1400" dirty="0"/>
-              <a:t>Files listed under this header specifies fallback pages if a page is inaccessible</a:t>
-            </a:r>
-            <a:endParaRPr lang="en-US" sz="1400" dirty="0" smtClean="0"/>
-          </a:p>
-        </p:txBody>
-      </p:sp>
+              <a:rPr lang="en-US" sz="1600" b="1" dirty="0" smtClean="0"/>
+              <a:t>Session Vs </a:t>
+            </a:r>
+            <a:r>
+              <a:rPr lang="en-US" sz="1600" b="1" dirty="0" smtClean="0"/>
+              <a:t>Local Storage</a:t>
+            </a:r>
+          </a:p>
+          <a:p>
+            <a:endParaRPr lang="en-US" sz="1600" dirty="0"/>
+          </a:p>
+          <a:p>
+            <a:endParaRPr lang="en-US" sz="1600" dirty="0" smtClean="0"/>
+          </a:p>
+          <a:p>
+            <a:endParaRPr lang="en-US" sz="1600" dirty="0"/>
+          </a:p>
+          <a:p>
+            <a:endParaRPr lang="en-US" sz="1600" dirty="0" smtClean="0"/>
+          </a:p>
+          <a:p>
+            <a:endParaRPr lang="en-US" sz="1600" dirty="0"/>
+          </a:p>
+          <a:p>
+            <a:endParaRPr lang="en-US" sz="1600" dirty="0" smtClean="0"/>
+          </a:p>
+          <a:p>
+            <a:endParaRPr lang="en-US" sz="1600" dirty="0"/>
+          </a:p>
+        </p:txBody>
+      </p:sp>
+      <p:graphicFrame>
+        <p:nvGraphicFramePr>
+          <p:cNvPr id="5" name="Table 4"/>
+          <p:cNvGraphicFramePr>
+            <a:graphicFrameLocks noGrp="1"/>
+          </p:cNvGraphicFramePr>
+          <p:nvPr>
+            <p:extLst>
+              <p:ext uri="{D42A27DB-BD31-4B8C-83A1-F6EECF244321}">
+                <p14:modId xmlns:p14="http://schemas.microsoft.com/office/powerpoint/2010/main" val="4225052162"/>
+              </p:ext>
+            </p:extLst>
+          </p:nvPr>
+        </p:nvGraphicFramePr>
+        <p:xfrm>
+          <a:off x="683568" y="2204864"/>
+          <a:ext cx="6552729" cy="2126495"/>
+        </p:xfrm>
+        <a:graphic>
+          <a:graphicData uri="http://schemas.openxmlformats.org/drawingml/2006/table">
+            <a:tbl>
+              <a:tblPr>
+                <a:tableStyleId>{616DA210-FB5B-4158-B5E0-FEB733F419BA}</a:tableStyleId>
+              </a:tblPr>
+              <a:tblGrid>
+                <a:gridCol w="1603306"/>
+                <a:gridCol w="1603306"/>
+                <a:gridCol w="3346117"/>
+              </a:tblGrid>
+              <a:tr h="285066">
+                <a:tc>
+                  <a:txBody>
+                    <a:bodyPr/>
+                    <a:lstStyle/>
+                    <a:p>
+                      <a:pPr algn="l"/>
+                      <a:r>
+                        <a:rPr lang="en-US" sz="1600" b="1" dirty="0" smtClean="0">
+                          <a:solidFill>
+                            <a:schemeClr val="tx1"/>
+                          </a:solidFill>
+                          <a:effectLst/>
+                          <a:latin typeface="+mn-lt"/>
+                        </a:rPr>
+                        <a:t>Category</a:t>
+                      </a:r>
+                      <a:endParaRPr lang="en-US" sz="1600" b="1" dirty="0">
+                        <a:solidFill>
+                          <a:srgbClr val="111111"/>
+                        </a:solidFill>
+                        <a:effectLst/>
+                        <a:latin typeface="Segoe UI"/>
+                      </a:endParaRPr>
+                    </a:p>
+                  </a:txBody>
+                  <a:tcPr marL="53591" marR="53591" marT="26796" marB="26796" anchor="ctr">
+                    <a:solidFill>
+                      <a:schemeClr val="tx1">
+                        <a:lumMod val="25000"/>
+                        <a:lumOff val="75000"/>
+                      </a:schemeClr>
+                    </a:solidFill>
+                  </a:tcPr>
+                </a:tc>
+                <a:tc>
+                  <a:txBody>
+                    <a:bodyPr/>
+                    <a:lstStyle/>
+                    <a:p>
+                      <a:pPr algn="ctr"/>
+                      <a:r>
+                        <a:rPr lang="en-US" sz="1600" b="1" dirty="0" smtClean="0">
+                          <a:effectLst/>
+                        </a:rPr>
+                        <a:t>Session Storage</a:t>
+                      </a:r>
+                      <a:endParaRPr lang="en-US" sz="1600" b="1" dirty="0">
+                        <a:solidFill>
+                          <a:srgbClr val="111111"/>
+                        </a:solidFill>
+                        <a:effectLst/>
+                        <a:latin typeface="Segoe UI"/>
+                      </a:endParaRPr>
+                    </a:p>
+                  </a:txBody>
+                  <a:tcPr marL="53591" marR="53591" marT="26796" marB="26796" anchor="ctr">
+                    <a:solidFill>
+                      <a:schemeClr val="tx1">
+                        <a:lumMod val="25000"/>
+                        <a:lumOff val="75000"/>
+                      </a:schemeClr>
+                    </a:solidFill>
+                  </a:tcPr>
+                </a:tc>
+                <a:tc>
+                  <a:txBody>
+                    <a:bodyPr/>
+                    <a:lstStyle/>
+                    <a:p>
+                      <a:pPr marL="0" marR="0" indent="0" algn="ctr" defTabSz="914400" rtl="0" eaLnBrk="1" fontAlgn="auto" latinLnBrk="0" hangingPunct="1">
+                        <a:lnSpc>
+                          <a:spcPct val="100000"/>
+                        </a:lnSpc>
+                        <a:spcBef>
+                          <a:spcPts val="0"/>
+                        </a:spcBef>
+                        <a:spcAft>
+                          <a:spcPts val="0"/>
+                        </a:spcAft>
+                        <a:buClrTx/>
+                        <a:buSzTx/>
+                        <a:buFontTx/>
+                        <a:buNone/>
+                        <a:tabLst/>
+                        <a:defRPr/>
+                      </a:pPr>
+                      <a:endParaRPr lang="en-US" sz="1600" b="1" dirty="0" smtClean="0">
+                        <a:effectLst/>
+                      </a:endParaRPr>
+                    </a:p>
+                    <a:p>
+                      <a:pPr marL="0" marR="0" indent="0" algn="ctr" defTabSz="914400" rtl="0" eaLnBrk="1" fontAlgn="auto" latinLnBrk="0" hangingPunct="1">
+                        <a:lnSpc>
+                          <a:spcPct val="100000"/>
+                        </a:lnSpc>
+                        <a:spcBef>
+                          <a:spcPts val="0"/>
+                        </a:spcBef>
+                        <a:spcAft>
+                          <a:spcPts val="0"/>
+                        </a:spcAft>
+                        <a:buClrTx/>
+                        <a:buSzTx/>
+                        <a:buFontTx/>
+                        <a:buNone/>
+                        <a:tabLst/>
+                        <a:defRPr/>
+                      </a:pPr>
+                      <a:r>
+                        <a:rPr lang="en-US" sz="1600" b="1" dirty="0" smtClean="0">
+                          <a:effectLst/>
+                        </a:rPr>
+                        <a:t>Local storage</a:t>
+                      </a:r>
+                    </a:p>
+                    <a:p>
+                      <a:pPr algn="ctr"/>
+                      <a:endParaRPr lang="en-US" sz="1600" b="1" dirty="0"/>
+                    </a:p>
+                  </a:txBody>
+                  <a:tcPr marL="53591" marR="53591" marT="26796" marB="26796" anchor="ctr">
+                    <a:solidFill>
+                      <a:schemeClr val="tx1">
+                        <a:lumMod val="25000"/>
+                        <a:lumOff val="75000"/>
+                      </a:schemeClr>
+                    </a:solidFill>
+                  </a:tcPr>
+                </a:tc>
+              </a:tr>
+              <a:tr h="1056317">
+                <a:tc>
+                  <a:txBody>
+                    <a:bodyPr/>
+                    <a:lstStyle/>
+                    <a:p>
+                      <a:r>
+                        <a:rPr lang="en-US" sz="1100" dirty="0" smtClean="0">
+                          <a:effectLst/>
+                        </a:rPr>
+                        <a:t>Lifetime</a:t>
+                      </a:r>
+                      <a:endParaRPr lang="en-US" sz="1100" dirty="0">
+                        <a:solidFill>
+                          <a:srgbClr val="111111"/>
+                        </a:solidFill>
+                        <a:effectLst/>
+                        <a:latin typeface="Segoe UI"/>
+                      </a:endParaRPr>
+                    </a:p>
+                  </a:txBody>
+                  <a:tcPr marL="53591" marR="53591" marT="26796" marB="26796" anchor="ctr"/>
+                </a:tc>
+                <a:tc>
+                  <a:txBody>
+                    <a:bodyPr/>
+                    <a:lstStyle/>
+                    <a:p>
+                      <a:r>
+                        <a:rPr lang="en-GB" sz="1100" kern="1200" dirty="0" smtClean="0">
+                          <a:solidFill>
+                            <a:schemeClr val="tx1"/>
+                          </a:solidFill>
+                          <a:effectLst/>
+                          <a:latin typeface="+mn-lt"/>
+                          <a:ea typeface="+mn-ea"/>
+                          <a:cs typeface="+mn-cs"/>
+                        </a:rPr>
+                        <a:t>Same lifetime as the top-level</a:t>
+                      </a:r>
+                      <a:r>
+                        <a:rPr lang="en-GB" sz="1100" kern="1200" baseline="0" dirty="0" smtClean="0">
+                          <a:solidFill>
+                            <a:schemeClr val="tx1"/>
+                          </a:solidFill>
+                          <a:effectLst/>
+                          <a:latin typeface="+mn-lt"/>
+                          <a:ea typeface="+mn-ea"/>
+                          <a:cs typeface="+mn-cs"/>
+                        </a:rPr>
+                        <a:t> window or browser tab</a:t>
+                      </a:r>
+                      <a:endParaRPr lang="en-GB" sz="1100" kern="1200" dirty="0">
+                        <a:solidFill>
+                          <a:schemeClr val="tx1"/>
+                        </a:solidFill>
+                        <a:effectLst/>
+                        <a:latin typeface="+mn-lt"/>
+                        <a:ea typeface="+mn-ea"/>
+                        <a:cs typeface="+mn-cs"/>
+                      </a:endParaRPr>
+                    </a:p>
+                  </a:txBody>
+                  <a:tcPr marL="53591" marR="53591" marT="26796" marB="26796" anchor="ctr"/>
+                </a:tc>
+                <a:tc>
+                  <a:txBody>
+                    <a:bodyPr/>
+                    <a:lstStyle/>
+                    <a:p>
+                      <a:r>
+                        <a:rPr lang="en-GB" sz="1100" dirty="0" smtClean="0">
+                          <a:effectLst/>
+                        </a:rPr>
+                        <a:t>Storage is permeant</a:t>
+                      </a:r>
+                      <a:r>
+                        <a:rPr lang="en-GB" sz="1100" baseline="0" dirty="0" smtClean="0">
+                          <a:effectLst/>
+                        </a:rPr>
+                        <a:t>. It doesn’t expire. </a:t>
+                      </a:r>
+                      <a:r>
+                        <a:rPr lang="en-GB" sz="1100" kern="1200" baseline="0" dirty="0" smtClean="0">
+                          <a:solidFill>
+                            <a:schemeClr val="tx1"/>
+                          </a:solidFill>
+                          <a:effectLst/>
+                          <a:latin typeface="+mn-lt"/>
+                          <a:ea typeface="+mn-ea"/>
+                          <a:cs typeface="+mn-cs"/>
+                        </a:rPr>
+                        <a:t>R</a:t>
+                      </a:r>
+                      <a:r>
+                        <a:rPr lang="en-GB" sz="1100" kern="1200" dirty="0" smtClean="0">
+                          <a:solidFill>
+                            <a:schemeClr val="tx1"/>
+                          </a:solidFill>
+                          <a:effectLst/>
+                          <a:latin typeface="+mn-lt"/>
+                          <a:ea typeface="+mn-ea"/>
+                          <a:cs typeface="+mn-cs"/>
+                        </a:rPr>
+                        <a:t>emains stored on the user’s computer until a web app deletes it or the user asks the browser to delete it</a:t>
+                      </a:r>
+                      <a:endParaRPr lang="en-GB" sz="1100" kern="1200" dirty="0">
+                        <a:solidFill>
+                          <a:schemeClr val="tx1"/>
+                        </a:solidFill>
+                        <a:effectLst/>
+                        <a:latin typeface="+mn-lt"/>
+                        <a:ea typeface="+mn-ea"/>
+                        <a:cs typeface="+mn-cs"/>
+                      </a:endParaRPr>
+                    </a:p>
+                  </a:txBody>
+                  <a:tcPr marL="53591" marR="53591" marT="26796" marB="26796" anchor="ctr"/>
+                </a:tc>
+              </a:tr>
+              <a:tr h="285066">
+                <a:tc>
+                  <a:txBody>
+                    <a:bodyPr/>
+                    <a:lstStyle/>
+                    <a:p>
+                      <a:r>
+                        <a:rPr lang="en-US" sz="1100" dirty="0" smtClean="0">
+                          <a:effectLst/>
+                        </a:rPr>
+                        <a:t>Window close</a:t>
+                      </a:r>
+                      <a:endParaRPr lang="en-US" sz="1100" dirty="0">
+                        <a:solidFill>
+                          <a:srgbClr val="111111"/>
+                        </a:solidFill>
+                        <a:effectLst/>
+                        <a:latin typeface="Segoe UI"/>
+                      </a:endParaRPr>
+                    </a:p>
+                  </a:txBody>
+                  <a:tcPr marL="53591" marR="53591" marT="26796" marB="26796" anchor="ctr"/>
+                </a:tc>
+                <a:tc>
+                  <a:txBody>
+                    <a:bodyPr/>
+                    <a:lstStyle/>
+                    <a:p>
+                      <a:r>
+                        <a:rPr lang="en-US" sz="1100" dirty="0" smtClean="0">
+                          <a:effectLst/>
+                        </a:rPr>
+                        <a:t>Deletes the storage</a:t>
+                      </a:r>
+                      <a:endParaRPr lang="en-US" sz="1100" dirty="0">
+                        <a:solidFill>
+                          <a:srgbClr val="111111"/>
+                        </a:solidFill>
+                        <a:effectLst/>
+                        <a:latin typeface="Segoe UI"/>
+                      </a:endParaRPr>
+                    </a:p>
+                  </a:txBody>
+                  <a:tcPr marL="53591" marR="53591" marT="26796" marB="26796" anchor="ctr"/>
+                </a:tc>
+                <a:tc>
+                  <a:txBody>
+                    <a:bodyPr/>
+                    <a:lstStyle/>
+                    <a:p>
+                      <a:r>
+                        <a:rPr lang="en-US" sz="1100" dirty="0" smtClean="0">
+                          <a:effectLst/>
+                        </a:rPr>
+                        <a:t>Doesn’t</a:t>
+                      </a:r>
+                      <a:r>
+                        <a:rPr lang="en-US" sz="1100" baseline="0" dirty="0" smtClean="0">
+                          <a:effectLst/>
+                        </a:rPr>
+                        <a:t> delete the storage</a:t>
+                      </a:r>
+                      <a:endParaRPr lang="en-US" sz="1100" dirty="0">
+                        <a:solidFill>
+                          <a:srgbClr val="111111"/>
+                        </a:solidFill>
+                        <a:effectLst/>
+                        <a:latin typeface="Segoe UI"/>
+                      </a:endParaRPr>
+                    </a:p>
+                  </a:txBody>
+                  <a:tcPr marL="53591" marR="53591" marT="26796" marB="26796" anchor="ctr"/>
+                </a:tc>
+              </a:tr>
+            </a:tbl>
+          </a:graphicData>
+        </a:graphic>
+      </p:graphicFrame>
     </p:spTree>
     <p:extLst>
       <p:ext uri="{BB962C8B-B14F-4D97-AF65-F5344CB8AC3E}">
-        <p14:creationId xmlns:p14="http://schemas.microsoft.com/office/powerpoint/2010/main" val="1443694004"/>
+        <p14:creationId xmlns:p14="http://schemas.microsoft.com/office/powerpoint/2010/main" val="3487521824"/>
       </p:ext>
     </p:extLst>
   </p:cSld>
@@ -3656,7 +3948,7 @@
           <a:p>
             <a:r>
               <a:rPr lang="en-US" dirty="0" smtClean="0"/>
-              <a:t>HTML5 – Deprecated Elements</a:t>
+              <a:t>HTML5 – New API</a:t>
             </a:r>
             <a:endParaRPr lang="en-US" dirty="0"/>
           </a:p>
@@ -3681,6 +3973,347 @@
           <a:p>
             <a:r>
               <a:rPr lang="en-GB" sz="1600" dirty="0" smtClean="0"/>
+              <a:t>HTML </a:t>
+            </a:r>
+            <a:r>
+              <a:rPr lang="en-GB" sz="1600" dirty="0"/>
+              <a:t>5 </a:t>
+            </a:r>
+            <a:r>
+              <a:rPr lang="en-GB" sz="1600" dirty="0" smtClean="0"/>
+              <a:t>new APIs are:</a:t>
+            </a:r>
+          </a:p>
+          <a:p>
+            <a:pPr lvl="1"/>
+            <a:r>
+              <a:rPr lang="en-US" sz="1400" dirty="0" smtClean="0"/>
+              <a:t>Media API</a:t>
+            </a:r>
+          </a:p>
+          <a:p>
+            <a:pPr lvl="1"/>
+            <a:r>
+              <a:rPr lang="en-US" sz="1400" dirty="0" smtClean="0"/>
+              <a:t>Text Track API</a:t>
+            </a:r>
+          </a:p>
+          <a:p>
+            <a:pPr lvl="1"/>
+            <a:r>
+              <a:rPr lang="en-US" sz="1400" dirty="0" smtClean="0"/>
+              <a:t>Application Cache API</a:t>
+            </a:r>
+          </a:p>
+          <a:p>
+            <a:pPr lvl="1"/>
+            <a:r>
+              <a:rPr lang="en-US" sz="1400" dirty="0" smtClean="0"/>
+              <a:t>User Interaction</a:t>
+            </a:r>
+          </a:p>
+          <a:p>
+            <a:pPr lvl="1"/>
+            <a:r>
+              <a:rPr lang="en-US" sz="1400" dirty="0" smtClean="0"/>
+              <a:t>Data Transfer API</a:t>
+            </a:r>
+          </a:p>
+          <a:p>
+            <a:pPr lvl="1"/>
+            <a:r>
+              <a:rPr lang="en-US" sz="1400" dirty="0" smtClean="0"/>
+              <a:t>Command API</a:t>
+            </a:r>
+          </a:p>
+          <a:p>
+            <a:pPr lvl="1"/>
+            <a:r>
+              <a:rPr lang="en-US" sz="1400" dirty="0" smtClean="0"/>
+              <a:t>Constraint Validation API</a:t>
+            </a:r>
+          </a:p>
+          <a:p>
+            <a:pPr lvl="1"/>
+            <a:r>
+              <a:rPr lang="en-US" sz="1400" dirty="0" smtClean="0"/>
+              <a:t>History API</a:t>
+            </a:r>
+          </a:p>
+          <a:p>
+            <a:pPr lvl="1"/>
+            <a:endParaRPr lang="en-US" sz="1200" dirty="0" smtClean="0"/>
+          </a:p>
+        </p:txBody>
+      </p:sp>
+    </p:spTree>
+    <p:extLst>
+      <p:ext uri="{BB962C8B-B14F-4D97-AF65-F5344CB8AC3E}">
+        <p14:creationId xmlns:p14="http://schemas.microsoft.com/office/powerpoint/2010/main" val="664375382"/>
+      </p:ext>
+    </p:extLst>
+  </p:cSld>
+  <p:clrMapOvr>
+    <a:masterClrMapping/>
+  </p:clrMapOvr>
+  <p:timing>
+    <p:tnLst>
+      <p:par>
+        <p:cTn id="1" dur="indefinite" restart="never" nodeType="tmRoot"/>
+      </p:par>
+    </p:tnLst>
+  </p:timing>
+</p:sld>
+</file>
+
+<file path=ppt/slides/slide12.xml><?xml version="1.0" encoding="utf-8"?>
+<p:sld xmlns:a="http://schemas.openxmlformats.org/drawingml/2006/main" xmlns:r="http://schemas.openxmlformats.org/officeDocument/2006/relationships" xmlns:p="http://schemas.openxmlformats.org/presentationml/2006/main">
+  <p:cSld>
+    <p:spTree>
+      <p:nvGrpSpPr>
+        <p:cNvPr id="1" name=""/>
+        <p:cNvGrpSpPr/>
+        <p:nvPr/>
+      </p:nvGrpSpPr>
+      <p:grpSpPr>
+        <a:xfrm>
+          <a:off x="0" y="0"/>
+          <a:ext cx="0" cy="0"/>
+          <a:chOff x="0" y="0"/>
+          <a:chExt cx="0" cy="0"/>
+        </a:xfrm>
+      </p:grpSpPr>
+      <p:sp>
+        <p:nvSpPr>
+          <p:cNvPr id="2" name="Title 1"/>
+          <p:cNvSpPr>
+            <a:spLocks noGrp="1"/>
+          </p:cNvSpPr>
+          <p:nvPr>
+            <p:ph type="title"/>
+          </p:nvPr>
+        </p:nvSpPr>
+        <p:spPr/>
+        <p:txBody>
+          <a:bodyPr/>
+          <a:lstStyle/>
+          <a:p>
+            <a:r>
+              <a:rPr lang="en-US" dirty="0" smtClean="0"/>
+              <a:t>HTML5 – Application Cache</a:t>
+            </a:r>
+            <a:endParaRPr lang="en-US" dirty="0"/>
+          </a:p>
+        </p:txBody>
+      </p:sp>
+      <p:sp>
+        <p:nvSpPr>
+          <p:cNvPr id="3" name="Content Placeholder 2"/>
+          <p:cNvSpPr>
+            <a:spLocks noGrp="1"/>
+          </p:cNvSpPr>
+          <p:nvPr>
+            <p:ph idx="1"/>
+          </p:nvPr>
+        </p:nvSpPr>
+        <p:spPr/>
+        <p:txBody>
+          <a:bodyPr>
+            <a:normAutofit/>
+          </a:bodyPr>
+          <a:lstStyle/>
+          <a:p>
+            <a:r>
+              <a:rPr lang="en-GB" sz="1600" dirty="0" smtClean="0"/>
+              <a:t>Application cache enables us to make an offline version of a web application i.e. </a:t>
+            </a:r>
+            <a:r>
+              <a:rPr lang="en-GB" sz="1600" b="1" dirty="0" smtClean="0"/>
+              <a:t>offline browsing</a:t>
+            </a:r>
+          </a:p>
+          <a:p>
+            <a:r>
+              <a:rPr lang="en-GB" sz="1600" dirty="0" smtClean="0"/>
+              <a:t>Fetches few or all of website contents such as HTML files, CSS, images, JavaScript etc. locally</a:t>
+            </a:r>
+          </a:p>
+          <a:p>
+            <a:r>
+              <a:rPr lang="en-GB" sz="1600" dirty="0" smtClean="0"/>
+              <a:t>Speeds up the site performance</a:t>
+            </a:r>
+          </a:p>
+          <a:p>
+            <a:r>
+              <a:rPr lang="en-GB" sz="1600" dirty="0" smtClean="0"/>
+              <a:t>Achieved with the help of a manifest file </a:t>
+            </a:r>
+          </a:p>
+          <a:p>
+            <a:pPr lvl="1"/>
+            <a:r>
+              <a:rPr lang="en-US" sz="1400" dirty="0"/>
+              <a:t>&lt;html manifest="demo.appcache</a:t>
+            </a:r>
+            <a:r>
+              <a:rPr lang="en-US" sz="1400" dirty="0" smtClean="0"/>
+              <a:t>"&gt;</a:t>
+            </a:r>
+          </a:p>
+          <a:p>
+            <a:r>
+              <a:rPr lang="en-US" sz="1600" dirty="0" smtClean="0"/>
+              <a:t>Manifest file is a simple text file,</a:t>
+            </a:r>
+            <a:r>
+              <a:rPr lang="en-GB" sz="1600" dirty="0"/>
+              <a:t> which tells the browser what to </a:t>
+            </a:r>
+            <a:r>
+              <a:rPr lang="en-GB" sz="1600" dirty="0" smtClean="0"/>
+              <a:t>cache</a:t>
+            </a:r>
+          </a:p>
+          <a:p>
+            <a:r>
+              <a:rPr lang="en-GB" sz="1600" dirty="0"/>
+              <a:t>The manifest file has three sections</a:t>
+            </a:r>
+            <a:r>
+              <a:rPr lang="en-GB" sz="1600" dirty="0" smtClean="0"/>
+              <a:t>:</a:t>
+            </a:r>
+          </a:p>
+          <a:p>
+            <a:pPr lvl="1"/>
+            <a:r>
+              <a:rPr lang="en-GB" sz="1400" b="1" dirty="0" smtClean="0"/>
+              <a:t>CACHE MANIFEST </a:t>
+            </a:r>
+            <a:r>
+              <a:rPr lang="en-GB" sz="1400" dirty="0" smtClean="0"/>
+              <a:t>- </a:t>
+            </a:r>
+            <a:r>
+              <a:rPr lang="en-GB" sz="1400" dirty="0"/>
+              <a:t>Files listed under this header will be cached after they are downloaded for the first time</a:t>
+            </a:r>
+            <a:endParaRPr lang="en-GB" sz="1400" dirty="0" smtClean="0"/>
+          </a:p>
+          <a:p>
+            <a:pPr lvl="1"/>
+            <a:r>
+              <a:rPr lang="en-GB" sz="1400" b="1" dirty="0" smtClean="0"/>
+              <a:t>NETWORK</a:t>
+            </a:r>
+            <a:r>
+              <a:rPr lang="en-GB" sz="1400" dirty="0" smtClean="0"/>
+              <a:t> - </a:t>
+            </a:r>
+            <a:r>
+              <a:rPr lang="en-GB" sz="1400" dirty="0"/>
+              <a:t>Files listed under this header require a connection to the server, and will never be cached</a:t>
+            </a:r>
+            <a:endParaRPr lang="en-GB" sz="1400" dirty="0" smtClean="0"/>
+          </a:p>
+          <a:p>
+            <a:pPr lvl="1"/>
+            <a:r>
+              <a:rPr lang="en-GB" sz="1400" b="1" dirty="0" smtClean="0"/>
+              <a:t>FALLBACK</a:t>
+            </a:r>
+            <a:r>
+              <a:rPr lang="en-GB" sz="1400" dirty="0" smtClean="0"/>
+              <a:t> - </a:t>
+            </a:r>
+            <a:r>
+              <a:rPr lang="en-GB" sz="1400" dirty="0"/>
+              <a:t>Files listed under this header specifies fallback pages if a page is inaccessible</a:t>
+            </a:r>
+            <a:endParaRPr lang="en-US" sz="1400" dirty="0" smtClean="0"/>
+          </a:p>
+        </p:txBody>
+      </p:sp>
+    </p:spTree>
+    <p:extLst>
+      <p:ext uri="{BB962C8B-B14F-4D97-AF65-F5344CB8AC3E}">
+        <p14:creationId xmlns:p14="http://schemas.microsoft.com/office/powerpoint/2010/main" val="1443694004"/>
+      </p:ext>
+    </p:extLst>
+  </p:cSld>
+  <p:clrMapOvr>
+    <a:masterClrMapping/>
+  </p:clrMapOvr>
+  <p:timing>
+    <p:tnLst>
+      <p:par>
+        <p:cTn id="1" dur="indefinite" restart="never" nodeType="tmRoot"/>
+      </p:par>
+    </p:tnLst>
+  </p:timing>
+</p:sld>
+</file>
+
+<file path=ppt/slides/slide13.xml><?xml version="1.0" encoding="utf-8"?>
+<p:sld xmlns:a="http://schemas.openxmlformats.org/drawingml/2006/main" xmlns:r="http://schemas.openxmlformats.org/officeDocument/2006/relationships" xmlns:p="http://schemas.openxmlformats.org/presentationml/2006/main">
+  <p:cSld>
+    <p:spTree>
+      <p:nvGrpSpPr>
+        <p:cNvPr id="1" name=""/>
+        <p:cNvGrpSpPr/>
+        <p:nvPr/>
+      </p:nvGrpSpPr>
+      <p:grpSpPr>
+        <a:xfrm>
+          <a:off x="0" y="0"/>
+          <a:ext cx="0" cy="0"/>
+          <a:chOff x="0" y="0"/>
+          <a:chExt cx="0" cy="0"/>
+        </a:xfrm>
+      </p:grpSpPr>
+      <p:sp>
+        <p:nvSpPr>
+          <p:cNvPr id="2" name="Title 1"/>
+          <p:cNvSpPr>
+            <a:spLocks noGrp="1"/>
+          </p:cNvSpPr>
+          <p:nvPr>
+            <p:ph type="title"/>
+          </p:nvPr>
+        </p:nvSpPr>
+        <p:spPr/>
+        <p:txBody>
+          <a:bodyPr/>
+          <a:lstStyle/>
+          <a:p>
+            <a:r>
+              <a:rPr lang="en-US" dirty="0" smtClean="0"/>
+              <a:t>HTML5 – Deprecated Elements</a:t>
+            </a:r>
+            <a:endParaRPr lang="en-US" dirty="0"/>
+          </a:p>
+        </p:txBody>
+      </p:sp>
+      <p:sp>
+        <p:nvSpPr>
+          <p:cNvPr id="3" name="Content Placeholder 2"/>
+          <p:cNvSpPr>
+            <a:spLocks noGrp="1"/>
+          </p:cNvSpPr>
+          <p:nvPr>
+            <p:ph idx="1"/>
+          </p:nvPr>
+        </p:nvSpPr>
+        <p:spPr/>
+        <p:txBody>
+          <a:bodyPr>
+            <a:normAutofit/>
+          </a:bodyPr>
+          <a:lstStyle/>
+          <a:p>
+            <a:r>
+              <a:rPr lang="en-GB" sz="1600" dirty="0" smtClean="0"/>
               <a:t>Deprecated </a:t>
             </a:r>
             <a:r>
@@ -3726,7 +4359,6 @@
               <a:rPr lang="en-US" sz="1400" dirty="0" smtClean="0"/>
               <a:t>big</a:t>
             </a:r>
-            <a:endParaRPr lang="en-US" sz="1400" dirty="0" smtClean="0"/>
           </a:p>
           <a:p>
             <a:pPr lvl="1"/>
@@ -3768,7 +4400,7 @@
 </p:sld>
 </file>
 
-<file path=ppt/slides/slide12.xml><?xml version="1.0" encoding="utf-8"?>
+<file path=ppt/slides/slide14.xml><?xml version="1.0" encoding="utf-8"?>
 <p:sld xmlns:a="http://schemas.openxmlformats.org/drawingml/2006/main" xmlns:r="http://schemas.openxmlformats.org/officeDocument/2006/relationships" xmlns:p="http://schemas.openxmlformats.org/presentationml/2006/main">
   <p:cSld>
     <p:spTree>
@@ -3900,7 +4532,7 @@
           <a:p>
             <a:r>
               <a:rPr lang="en-US" dirty="0" smtClean="0"/>
-              <a:t>HTML5</a:t>
+              <a:t>HTML5 Major Goals</a:t>
             </a:r>
             <a:endParaRPr lang="en-US" dirty="0"/>
           </a:p>
@@ -3924,151 +4556,97 @@
           <a:lstStyle/>
           <a:p>
             <a:r>
-              <a:rPr lang="en-US" sz="1600" b="1" dirty="0" smtClean="0"/>
-              <a:t>SVG</a:t>
-            </a:r>
-            <a:r>
               <a:rPr lang="en-US" sz="1600" dirty="0" smtClean="0"/>
-              <a:t> – Scalable Vector Graphics</a:t>
-            </a:r>
-          </a:p>
-          <a:p>
-            <a:r>
-              <a:rPr lang="en-US" sz="1600" b="1" dirty="0" smtClean="0"/>
-              <a:t>MathML</a:t>
-            </a:r>
+              <a:t>Deliver rich content (graphics, movies etc.) without the need of additional plugins such as Silverlight, Flash etc.</a:t>
+            </a:r>
+          </a:p>
+          <a:p>
             <a:r>
               <a:rPr lang="en-US" sz="1600" dirty="0" smtClean="0"/>
-              <a:t> – Mathematical Markup Language</a:t>
-            </a:r>
-            <a:endParaRPr lang="en-US" sz="1600" dirty="0" smtClean="0"/>
-          </a:p>
-          <a:p>
-            <a:r>
-              <a:rPr lang="en-US" sz="1600" b="1" dirty="0" smtClean="0"/>
-              <a:t>Web Storage</a:t>
-            </a:r>
+              <a:t>Better cross platform support (PC, Tablet, Smartphone)</a:t>
+            </a:r>
+          </a:p>
+          <a:p>
             <a:r>
               <a:rPr lang="en-US" sz="1600" dirty="0" smtClean="0"/>
-              <a:t> – session storage and local storage</a:t>
+              <a:t>Strict parsing standard to simplify error handling</a:t>
             </a:r>
           </a:p>
           <a:p>
             <a:r>
               <a:rPr lang="en-US" sz="1600" dirty="0" smtClean="0"/>
-              <a:t>Web SQL</a:t>
-            </a:r>
-          </a:p>
-          <a:p>
-            <a:r>
-              <a:rPr lang="en-US" sz="1600" b="1" dirty="0" smtClean="0"/>
-              <a:t>Server Sent Events</a:t>
+              <a:t>Better semantic support through the introduction of new structural </a:t>
+            </a:r>
+            <a:r>
+              <a:rPr lang="en-US" sz="1600" dirty="0"/>
+              <a:t>element tags </a:t>
             </a:r>
             <a:r>
               <a:rPr lang="en-US" sz="1600" dirty="0" smtClean="0"/>
-              <a:t> - &lt;eventsource</a:t>
+              <a:t>(&lt;</a:t>
             </a:r>
             <a:r>
               <a:rPr lang="en-US" sz="1600" dirty="0"/>
-              <a:t>&gt;, Content-Type: </a:t>
+              <a:t>header&gt;</a:t>
+            </a:r>
+            <a:r>
+              <a:rPr lang="en-US" sz="1600" dirty="0"/>
+              <a:t>, </a:t>
+            </a:r>
+            <a:r>
+              <a:rPr lang="en-US" sz="1600" dirty="0"/>
+              <a:t>&lt;article&gt;</a:t>
+            </a:r>
+            <a:r>
+              <a:rPr lang="en-US" sz="1600" dirty="0"/>
+              <a:t>, </a:t>
+            </a:r>
+            <a:r>
+              <a:rPr lang="en-US" sz="1600" dirty="0"/>
+              <a:t>&lt;section&gt;</a:t>
+            </a:r>
+            <a:r>
+              <a:rPr lang="en-US" sz="1600" dirty="0"/>
+              <a:t>, </a:t>
+            </a:r>
+            <a:r>
+              <a:rPr lang="en-US" sz="1600" dirty="0"/>
+              <a:t>&lt;footer</a:t>
             </a:r>
             <a:r>
               <a:rPr lang="en-US" sz="1600" dirty="0" smtClean="0"/>
-              <a:t>text/event-stream</a:t>
-            </a:r>
-          </a:p>
-          <a:p>
-            <a:r>
-              <a:rPr lang="en-US" sz="1600" b="1" dirty="0" smtClean="0"/>
-              <a:t>WebSockets</a:t>
-            </a:r>
-            <a:r>
-              <a:rPr lang="en-US" sz="1600" dirty="0" smtClean="0"/>
-              <a:t> - </a:t>
-            </a:r>
-            <a:r>
-              <a:rPr lang="en-US" sz="1600" dirty="0"/>
-              <a:t>next-generation bidirectional communication </a:t>
-            </a:r>
-            <a:r>
-              <a:rPr lang="en-US" sz="1600" dirty="0" smtClean="0"/>
-              <a:t>technology\</a:t>
-            </a:r>
-          </a:p>
-          <a:p>
-            <a:pPr lvl="1"/>
-            <a:r>
-              <a:rPr lang="en-US" sz="1600" dirty="0" smtClean="0"/>
-              <a:t>send() method</a:t>
-            </a:r>
-          </a:p>
-          <a:p>
-            <a:pPr lvl="1"/>
-            <a:r>
-              <a:rPr lang="en-US" sz="1600" dirty="0" smtClean="0"/>
-              <a:t>onmessage() method</a:t>
-            </a:r>
-          </a:p>
-          <a:p>
-            <a:pPr lvl="1"/>
-            <a:r>
-              <a:rPr lang="en-US" sz="1600" dirty="0" smtClean="0"/>
-              <a:t>close() method</a:t>
-            </a:r>
-          </a:p>
-          <a:p>
-            <a:r>
-              <a:rPr lang="en-US" sz="1600" b="1" dirty="0" smtClean="0"/>
-              <a:t>Canvas</a:t>
-            </a:r>
-            <a:r>
-              <a:rPr lang="en-US" sz="1600" dirty="0" smtClean="0"/>
-              <a:t> – an easy and powerful way to draw graphics using JavaScript</a:t>
-            </a:r>
-          </a:p>
-          <a:p>
-            <a:r>
-              <a:rPr lang="en-US" sz="1600" dirty="0" smtClean="0"/>
-              <a:t>Audio and Video</a:t>
-            </a:r>
-          </a:p>
-          <a:p>
-            <a:r>
-              <a:rPr lang="en-US" sz="1600" b="1" dirty="0" smtClean="0"/>
-              <a:t>Geolocation</a:t>
-            </a:r>
-            <a:r>
-              <a:rPr lang="en-US" sz="1600" dirty="0" smtClean="0"/>
-              <a:t> – Lets you to share your location with your favorite web sites</a:t>
-            </a:r>
-          </a:p>
-          <a:p>
-            <a:r>
-              <a:rPr lang="en-US" sz="1600" b="1" dirty="0" smtClean="0"/>
-              <a:t>Microdata</a:t>
-            </a:r>
-            <a:r>
-              <a:rPr lang="en-US" sz="1600" dirty="0" smtClean="0"/>
-              <a:t> – Standardized way to provide additional semantics in your web pages</a:t>
-            </a:r>
-          </a:p>
-          <a:p>
-            <a:pPr lvl="1"/>
-            <a:r>
-              <a:rPr lang="en-US" sz="1600" dirty="0" err="1" smtClean="0"/>
-              <a:t>itemscope</a:t>
-            </a:r>
-            <a:r>
-              <a:rPr lang="en-US" sz="1600" dirty="0" smtClean="0"/>
-              <a:t> attribute</a:t>
-            </a:r>
-          </a:p>
-          <a:p>
-            <a:pPr lvl="1"/>
-            <a:r>
-              <a:rPr lang="en-US" sz="1600" dirty="0" smtClean="0"/>
-              <a:t>itemprop attribute</a:t>
-            </a:r>
+              <a:t>&gt;)</a:t>
+            </a:r>
+          </a:p>
+          <a:p>
+            <a:pPr lvl="1">
+              <a:buFont typeface="Wingdings" panose="05000000000000000000" pitchFamily="2" charset="2"/>
+              <a:buChar char="Ø"/>
+            </a:pPr>
+            <a:r>
+              <a:rPr lang="en-US" sz="1400" dirty="0" smtClean="0"/>
+              <a:t>&lt;article&gt; - </a:t>
+            </a:r>
+            <a:r>
+              <a:rPr lang="en-GB" sz="1400" dirty="0"/>
+              <a:t>self-contained composition that can logically be independently recreated outside of the page </a:t>
+            </a:r>
+            <a:endParaRPr lang="en-GB" sz="1400" dirty="0" smtClean="0"/>
+          </a:p>
+          <a:p>
+            <a:pPr lvl="1">
+              <a:buFont typeface="Wingdings" panose="05000000000000000000" pitchFamily="2" charset="2"/>
+              <a:buChar char="Ø"/>
+            </a:pPr>
+            <a:r>
+              <a:rPr lang="en-GB" sz="1400" dirty="0" smtClean="0"/>
+              <a:t>&lt;section&gt; - </a:t>
+            </a:r>
+            <a:r>
+              <a:rPr lang="en-GB" sz="1400" dirty="0"/>
+              <a:t>flexible container for holding content that shares a common informational theme or purpose</a:t>
+            </a:r>
+            <a:endParaRPr lang="en-US" sz="1400" dirty="0" smtClean="0"/>
           </a:p>
           <a:p>
             <a:pPr lvl="1"/>
@@ -4165,140 +4743,149 @@
           <a:p>
             <a:r>
               <a:rPr lang="en-US" sz="1600" b="1" dirty="0" smtClean="0"/>
-              <a:t>Drag and Drop</a:t>
+              <a:t>SVG</a:t>
             </a:r>
             <a:r>
               <a:rPr lang="en-US" sz="1600" dirty="0" smtClean="0"/>
-              <a:t> – draggable attribute to true</a:t>
+              <a:t> – Scalable Vector Graphics</a:t>
             </a:r>
           </a:p>
           <a:p>
             <a:r>
               <a:rPr lang="en-US" sz="1600" b="1" dirty="0" smtClean="0"/>
-              <a:t>Webworkers</a:t>
+              <a:t>MathML</a:t>
             </a:r>
             <a:r>
               <a:rPr lang="en-US" sz="1600" dirty="0" smtClean="0"/>
-              <a:t> - Performs </a:t>
-            </a:r>
-            <a:r>
-              <a:rPr lang="en-GB" sz="1600" dirty="0" smtClean="0"/>
-              <a:t>computationally expensive tasks without interrupting the user interface and typically run on separate threads</a:t>
-            </a:r>
-          </a:p>
-          <a:p>
-            <a:r>
-              <a:rPr lang="en-GB" sz="1600" b="1" dirty="0" smtClean="0"/>
-              <a:t>IndexedDB</a:t>
-            </a:r>
-            <a:r>
-              <a:rPr lang="en-GB" sz="1600" dirty="0" smtClean="0"/>
-              <a:t> – Local storage is deprecated as per W3C, so IndexedDB is introduced</a:t>
-            </a:r>
-          </a:p>
-          <a:p>
-            <a:r>
-              <a:rPr lang="en-GB" sz="1600" b="1" dirty="0" smtClean="0"/>
-              <a:t>Web Messaging</a:t>
-            </a:r>
-            <a:r>
-              <a:rPr lang="en-GB" sz="1600" dirty="0" smtClean="0"/>
+              <a:t> – Mathematical Markup Language</a:t>
+            </a:r>
+          </a:p>
+          <a:p>
+            <a:r>
+              <a:rPr lang="en-US" sz="1600" b="1" dirty="0" smtClean="0"/>
+              <a:t>Web Storage</a:t>
+            </a:r>
+            <a:r>
+              <a:rPr lang="en-US" sz="1600" dirty="0" smtClean="0"/>
+              <a:t> – session storage and local storage</a:t>
+            </a:r>
+          </a:p>
+          <a:p>
+            <a:r>
+              <a:rPr lang="en-US" sz="1600" dirty="0" smtClean="0"/>
+              <a:t>Web SQL</a:t>
+            </a:r>
+          </a:p>
+          <a:p>
+            <a:r>
+              <a:rPr lang="en-US" sz="1600" b="1" dirty="0" smtClean="0"/>
+              <a:t>Server Sent Events</a:t>
+            </a:r>
+            <a:r>
+              <a:rPr lang="en-US" sz="1600" dirty="0" smtClean="0"/>
+              <a:t> - &lt;eventsource</a:t>
+            </a:r>
+            <a:r>
+              <a:rPr lang="en-US" sz="1600" dirty="0"/>
+              <a:t>&gt;, Content-Type: </a:t>
+            </a:r>
+            <a:r>
+              <a:rPr lang="en-US" sz="1600" dirty="0" smtClean="0"/>
+              <a:t>text/event-stream</a:t>
+            </a:r>
+          </a:p>
+          <a:p>
+            <a:r>
+              <a:rPr lang="en-US" sz="1600" b="1" dirty="0" smtClean="0"/>
+              <a:t>WebSockets</a:t>
+            </a:r>
+            <a:r>
+              <a:rPr lang="en-US" sz="1600" dirty="0" smtClean="0"/>
               <a:t> - </a:t>
             </a:r>
             <a:r>
-              <a:rPr lang="en-GB" sz="1600" dirty="0"/>
-              <a:t>W</a:t>
-            </a:r>
-            <a:r>
-              <a:rPr lang="en-GB" sz="1600" dirty="0" smtClean="0"/>
-              <a:t>ay </a:t>
-            </a:r>
-            <a:r>
-              <a:rPr lang="en-GB" sz="1600" dirty="0"/>
-              <a:t>for documents to </a:t>
-            </a:r>
-            <a:r>
-              <a:rPr lang="en-GB" sz="1600" dirty="0" smtClean="0"/>
-              <a:t>separate </a:t>
-            </a:r>
-            <a:r>
-              <a:rPr lang="en-GB" sz="1600" dirty="0"/>
-              <a:t>browsing context to share the data without </a:t>
-            </a:r>
-            <a:r>
-              <a:rPr lang="en-GB" sz="1600" dirty="0" smtClean="0"/>
-              <a:t>Dom e.g. send the data from your page to ad container which is placed at iframe or vice-versa</a:t>
-            </a:r>
-          </a:p>
-          <a:p>
-            <a:pPr lvl="1"/>
-            <a:r>
-              <a:rPr lang="en-GB" sz="1400" dirty="0" smtClean="0"/>
-              <a:t>Message event – fires cross-document messaging, </a:t>
-            </a:r>
-            <a:r>
-              <a:rPr lang="en-GB" sz="1400" dirty="0"/>
-              <a:t>channel messaging, server-sent events and web </a:t>
-            </a:r>
-            <a:r>
-              <a:rPr lang="en-GB" sz="1400" dirty="0" smtClean="0"/>
-              <a:t>sockets</a:t>
-            </a:r>
-          </a:p>
-          <a:p>
-            <a:pPr lvl="1"/>
-            <a:r>
-              <a:rPr lang="en-GB" sz="1400" dirty="0" smtClean="0"/>
-              <a:t>Sending a cross document message – message and targetOrigin</a:t>
-            </a:r>
-          </a:p>
-          <a:p>
-            <a:pPr lvl="1"/>
-            <a:r>
-              <a:rPr lang="en-GB" sz="1400" dirty="0" smtClean="0"/>
-              <a:t>Channel messaging – postMessage(), start() and close()</a:t>
-            </a:r>
-          </a:p>
-          <a:p>
-            <a:r>
-              <a:rPr lang="en-GB" sz="1600" b="1" dirty="0" smtClean="0"/>
-              <a:t>Web RTC</a:t>
-            </a:r>
-            <a:r>
-              <a:rPr lang="en-GB" sz="1600" dirty="0" smtClean="0"/>
-              <a:t> – Supports browser-to-browser applications for voice calling, video chat, and P2P file sharing. Three available APIs: </a:t>
-            </a:r>
-          </a:p>
-          <a:p>
-            <a:pPr lvl="1"/>
-            <a:r>
-              <a:rPr lang="en-GB" sz="1400" dirty="0" smtClean="0"/>
-              <a:t>mediastream – get access to users camera and microphone</a:t>
-            </a:r>
-          </a:p>
-          <a:p>
-            <a:pPr lvl="1"/>
-            <a:r>
-              <a:rPr lang="en-GB" sz="1400" dirty="0" smtClean="0"/>
-              <a:t>RTCPeerConnection - </a:t>
-            </a:r>
-            <a:r>
-              <a:rPr lang="en-GB" sz="1400" dirty="0"/>
-              <a:t>get access to audio or video calling facility</a:t>
-            </a:r>
-            <a:endParaRPr lang="en-GB" sz="1400" dirty="0" smtClean="0"/>
-          </a:p>
-          <a:p>
-            <a:pPr lvl="1"/>
-            <a:r>
-              <a:rPr lang="en-GB" sz="1400" dirty="0" smtClean="0"/>
-              <a:t>RTCDataChannel - </a:t>
-            </a:r>
-            <a:r>
-              <a:rPr lang="en-GB" sz="1400" dirty="0"/>
-              <a:t>get access to peer-to-peer communication</a:t>
-            </a:r>
-            <a:endParaRPr lang="en-US" sz="1400" dirty="0" smtClean="0"/>
+              <a:rPr lang="en-US" sz="1600" dirty="0"/>
+              <a:t>next-generation bidirectional communication </a:t>
+            </a:r>
+            <a:r>
+              <a:rPr lang="en-US" sz="1600" dirty="0" smtClean="0"/>
+              <a:t>technology\</a:t>
+            </a:r>
+          </a:p>
+          <a:p>
+            <a:pPr lvl="1"/>
+            <a:r>
+              <a:rPr lang="en-US" sz="1600" dirty="0" smtClean="0"/>
+              <a:t>send() method</a:t>
+            </a:r>
+          </a:p>
+          <a:p>
+            <a:pPr lvl="1"/>
+            <a:r>
+              <a:rPr lang="en-US" sz="1600" dirty="0" smtClean="0"/>
+              <a:t>onmessage() method</a:t>
+            </a:r>
+          </a:p>
+          <a:p>
+            <a:pPr lvl="1"/>
+            <a:r>
+              <a:rPr lang="en-US" sz="1600" dirty="0" smtClean="0"/>
+              <a:t>close() method</a:t>
+            </a:r>
+          </a:p>
+          <a:p>
+            <a:r>
+              <a:rPr lang="en-US" sz="1600" b="1" dirty="0" smtClean="0"/>
+              <a:t>Canvas</a:t>
+            </a:r>
+            <a:r>
+              <a:rPr lang="en-US" sz="1600" dirty="0" smtClean="0"/>
+              <a:t> – an easy and powerful way to draw graphics using JavaScript</a:t>
+            </a:r>
+          </a:p>
+          <a:p>
+            <a:r>
+              <a:rPr lang="en-US" sz="1600" dirty="0" smtClean="0"/>
+              <a:t>Audio and Video</a:t>
+            </a:r>
+          </a:p>
+          <a:p>
+            <a:r>
+              <a:rPr lang="en-US" sz="1600" b="1" dirty="0" smtClean="0"/>
+              <a:t>Geolocation</a:t>
+            </a:r>
+            <a:r>
+              <a:rPr lang="en-US" sz="1600" dirty="0" smtClean="0"/>
+              <a:t> – Lets you to share your location with your favorite web sites</a:t>
+            </a:r>
+          </a:p>
+          <a:p>
+            <a:r>
+              <a:rPr lang="en-US" sz="1600" b="1" dirty="0" smtClean="0"/>
+              <a:t>Microdata</a:t>
+            </a:r>
+            <a:r>
+              <a:rPr lang="en-US" sz="1600" dirty="0" smtClean="0"/>
+              <a:t> – Standardized way to provide additional semantics in your web pages</a:t>
+            </a:r>
+          </a:p>
+          <a:p>
+            <a:pPr lvl="1"/>
+            <a:r>
+              <a:rPr lang="en-US" sz="1600" dirty="0" err="1" smtClean="0"/>
+              <a:t>itemscope</a:t>
+            </a:r>
+            <a:r>
+              <a:rPr lang="en-US" sz="1600" dirty="0" smtClean="0"/>
+              <a:t> attribute</a:t>
+            </a:r>
+          </a:p>
+          <a:p>
+            <a:pPr lvl="1"/>
+            <a:r>
+              <a:rPr lang="en-US" sz="1600" dirty="0" smtClean="0"/>
+              <a:t>itemprop attribute</a:t>
+            </a:r>
           </a:p>
           <a:p>
             <a:pPr lvl="1"/>
@@ -4319,7 +4906,7 @@
     </p:spTree>
     <p:extLst>
       <p:ext uri="{BB962C8B-B14F-4D97-AF65-F5344CB8AC3E}">
-        <p14:creationId xmlns:p14="http://schemas.microsoft.com/office/powerpoint/2010/main" val="3586377518"/>
+        <p14:creationId xmlns:p14="http://schemas.microsoft.com/office/powerpoint/2010/main" val="3660870658"/>
       </p:ext>
     </p:extLst>
   </p:cSld>
@@ -4370,6 +4957,236 @@
           <a:p>
             <a:r>
               <a:rPr lang="en-US" dirty="0" smtClean="0"/>
+              <a:t>HTML5</a:t>
+            </a:r>
+            <a:endParaRPr lang="en-US" dirty="0"/>
+          </a:p>
+        </p:txBody>
+      </p:sp>
+      <p:sp>
+        <p:nvSpPr>
+          <p:cNvPr id="3" name="Content Placeholder 2"/>
+          <p:cNvSpPr>
+            <a:spLocks noGrp="1"/>
+          </p:cNvSpPr>
+          <p:nvPr>
+            <p:ph idx="1"/>
+          </p:nvPr>
+        </p:nvSpPr>
+        <p:spPr/>
+        <p:txBody>
+          <a:bodyPr>
+            <a:noAutofit/>
+          </a:bodyPr>
+          <a:lstStyle/>
+          <a:p>
+            <a:r>
+              <a:rPr lang="en-US" sz="1600" b="1" dirty="0" smtClean="0"/>
+              <a:t>Drag and Drop</a:t>
+            </a:r>
+            <a:r>
+              <a:rPr lang="en-US" sz="1600" dirty="0" smtClean="0"/>
+              <a:t> – draggable attribute to true</a:t>
+            </a:r>
+          </a:p>
+          <a:p>
+            <a:r>
+              <a:rPr lang="en-US" sz="1600" b="1" dirty="0" smtClean="0"/>
+              <a:t>Webworkers</a:t>
+            </a:r>
+            <a:r>
+              <a:rPr lang="en-US" sz="1600" dirty="0" smtClean="0"/>
+              <a:t> - Performs </a:t>
+            </a:r>
+            <a:r>
+              <a:rPr lang="en-GB" sz="1600" dirty="0" smtClean="0"/>
+              <a:t>computationally expensive tasks without interrupting the user interface and typically run on separate threads</a:t>
+            </a:r>
+          </a:p>
+          <a:p>
+            <a:r>
+              <a:rPr lang="en-GB" sz="1600" b="1" dirty="0" smtClean="0"/>
+              <a:t>IndexedDB</a:t>
+            </a:r>
+            <a:r>
+              <a:rPr lang="en-GB" sz="1600" dirty="0" smtClean="0"/>
+              <a:t> – Local storage is deprecated as per W3C, so IndexedDB is introduced</a:t>
+            </a:r>
+          </a:p>
+          <a:p>
+            <a:r>
+              <a:rPr lang="en-GB" sz="1600" b="1" dirty="0" smtClean="0"/>
+              <a:t>Web Messaging</a:t>
+            </a:r>
+            <a:r>
+              <a:rPr lang="en-GB" sz="1600" dirty="0" smtClean="0"/>
+              <a:t> - </a:t>
+            </a:r>
+            <a:r>
+              <a:rPr lang="en-GB" sz="1600" dirty="0"/>
+              <a:t>W</a:t>
+            </a:r>
+            <a:r>
+              <a:rPr lang="en-GB" sz="1600" dirty="0" smtClean="0"/>
+              <a:t>ay </a:t>
+            </a:r>
+            <a:r>
+              <a:rPr lang="en-GB" sz="1600" dirty="0"/>
+              <a:t>for documents to </a:t>
+            </a:r>
+            <a:r>
+              <a:rPr lang="en-GB" sz="1600" dirty="0" smtClean="0"/>
+              <a:t>separate </a:t>
+            </a:r>
+            <a:r>
+              <a:rPr lang="en-GB" sz="1600" dirty="0"/>
+              <a:t>browsing context to share the data without </a:t>
+            </a:r>
+            <a:r>
+              <a:rPr lang="en-GB" sz="1600" dirty="0" smtClean="0"/>
+              <a:t>Dom e.g. send the data from your page to ad container which is placed at iframe or vice-versa</a:t>
+            </a:r>
+          </a:p>
+          <a:p>
+            <a:pPr lvl="1"/>
+            <a:r>
+              <a:rPr lang="en-GB" sz="1400" dirty="0" smtClean="0"/>
+              <a:t>Message event – fires cross-document messaging, </a:t>
+            </a:r>
+            <a:r>
+              <a:rPr lang="en-GB" sz="1400" dirty="0"/>
+              <a:t>channel messaging, server-sent events and web </a:t>
+            </a:r>
+            <a:r>
+              <a:rPr lang="en-GB" sz="1400" dirty="0" smtClean="0"/>
+              <a:t>sockets</a:t>
+            </a:r>
+          </a:p>
+          <a:p>
+            <a:pPr lvl="1"/>
+            <a:r>
+              <a:rPr lang="en-GB" sz="1400" dirty="0" smtClean="0"/>
+              <a:t>Sending a cross document message – message and targetOrigin</a:t>
+            </a:r>
+          </a:p>
+          <a:p>
+            <a:pPr lvl="1"/>
+            <a:r>
+              <a:rPr lang="en-GB" sz="1400" dirty="0" smtClean="0"/>
+              <a:t>Channel messaging – postMessage(), start() and close()</a:t>
+            </a:r>
+          </a:p>
+          <a:p>
+            <a:r>
+              <a:rPr lang="en-GB" sz="1600" b="1" dirty="0" smtClean="0"/>
+              <a:t>Web RTC</a:t>
+            </a:r>
+            <a:r>
+              <a:rPr lang="en-GB" sz="1600" dirty="0" smtClean="0"/>
+              <a:t> – Supports browser-to-browser applications for voice calling, video chat, and P2P file sharing. Three available APIs: </a:t>
+            </a:r>
+          </a:p>
+          <a:p>
+            <a:pPr lvl="1"/>
+            <a:r>
+              <a:rPr lang="en-GB" sz="1400" dirty="0" smtClean="0"/>
+              <a:t>mediastream – get access to users camera and microphone</a:t>
+            </a:r>
+          </a:p>
+          <a:p>
+            <a:pPr lvl="1"/>
+            <a:r>
+              <a:rPr lang="en-GB" sz="1400" dirty="0" smtClean="0"/>
+              <a:t>RTCPeerConnection - </a:t>
+            </a:r>
+            <a:r>
+              <a:rPr lang="en-GB" sz="1400" dirty="0"/>
+              <a:t>get access to audio or video calling facility</a:t>
+            </a:r>
+            <a:endParaRPr lang="en-GB" sz="1400" dirty="0" smtClean="0"/>
+          </a:p>
+          <a:p>
+            <a:pPr lvl="1"/>
+            <a:r>
+              <a:rPr lang="en-GB" sz="1400" dirty="0" smtClean="0"/>
+              <a:t>RTCDataChannel - </a:t>
+            </a:r>
+            <a:r>
+              <a:rPr lang="en-GB" sz="1400" dirty="0"/>
+              <a:t>get access to peer-to-peer communication</a:t>
+            </a:r>
+            <a:endParaRPr lang="en-US" sz="1400" dirty="0" smtClean="0"/>
+          </a:p>
+          <a:p>
+            <a:pPr lvl="1"/>
+            <a:endParaRPr lang="en-US" sz="1600" dirty="0" smtClean="0"/>
+          </a:p>
+          <a:p>
+            <a:endParaRPr lang="en-US" sz="1600" dirty="0" smtClean="0"/>
+          </a:p>
+          <a:p>
+            <a:endParaRPr lang="en-US" sz="1600" dirty="0" smtClean="0"/>
+          </a:p>
+          <a:p>
+            <a:pPr lvl="1"/>
+            <a:endParaRPr lang="en-US" sz="1600" dirty="0"/>
+          </a:p>
+        </p:txBody>
+      </p:sp>
+    </p:spTree>
+    <p:extLst>
+      <p:ext uri="{BB962C8B-B14F-4D97-AF65-F5344CB8AC3E}">
+        <p14:creationId xmlns:p14="http://schemas.microsoft.com/office/powerpoint/2010/main" val="3586377518"/>
+      </p:ext>
+    </p:extLst>
+  </p:cSld>
+  <p:clrMapOvr>
+    <a:masterClrMapping/>
+  </p:clrMapOvr>
+  <p:timing>
+    <p:tnLst>
+      <p:par>
+        <p:cTn id="1" dur="indefinite" restart="never" nodeType="tmRoot"/>
+      </p:par>
+    </p:tnLst>
+  </p:timing>
+</p:sld>
+</file>
+
+<file path=ppt/slides/slide5.xml><?xml version="1.0" encoding="utf-8"?>
+<p:sld xmlns:a="http://schemas.openxmlformats.org/drawingml/2006/main" xmlns:r="http://schemas.openxmlformats.org/officeDocument/2006/relationships" xmlns:p="http://schemas.openxmlformats.org/presentationml/2006/main">
+  <p:cSld>
+    <p:spTree>
+      <p:nvGrpSpPr>
+        <p:cNvPr id="1" name=""/>
+        <p:cNvGrpSpPr/>
+        <p:nvPr/>
+      </p:nvGrpSpPr>
+      <p:grpSpPr>
+        <a:xfrm>
+          <a:off x="0" y="0"/>
+          <a:ext cx="0" cy="0"/>
+          <a:chOff x="0" y="0"/>
+          <a:chExt cx="0" cy="0"/>
+        </a:xfrm>
+      </p:grpSpPr>
+      <p:sp>
+        <p:nvSpPr>
+          <p:cNvPr id="2" name="Title 1"/>
+          <p:cNvSpPr>
+            <a:spLocks noGrp="1"/>
+          </p:cNvSpPr>
+          <p:nvPr>
+            <p:ph type="title"/>
+          </p:nvPr>
+        </p:nvSpPr>
+        <p:spPr/>
+        <p:txBody>
+          <a:bodyPr/>
+          <a:lstStyle/>
+          <a:p>
+            <a:r>
+              <a:rPr lang="en-US" dirty="0" smtClean="0"/>
               <a:t>HTML5 - CORS</a:t>
             </a:r>
             <a:endParaRPr lang="en-US" dirty="0"/>
@@ -4529,7 +5346,7 @@
 </p:sld>
 </file>
 
-<file path=ppt/slides/slide5.xml><?xml version="1.0" encoding="utf-8"?>
+<file path=ppt/slides/slide6.xml><?xml version="1.0" encoding="utf-8"?>
 <p:sld xmlns:a="http://schemas.openxmlformats.org/drawingml/2006/main" xmlns:r="http://schemas.openxmlformats.org/officeDocument/2006/relationships" xmlns:p="http://schemas.openxmlformats.org/presentationml/2006/main">
   <p:cSld>
     <p:spTree>
@@ -4717,7 +5534,7 @@
 </p:sld>
 </file>
 
-<file path=ppt/slides/slide6.xml><?xml version="1.0" encoding="utf-8"?>
+<file path=ppt/slides/slide7.xml><?xml version="1.0" encoding="utf-8"?>
 <p:sld xmlns:a="http://schemas.openxmlformats.org/drawingml/2006/main" xmlns:r="http://schemas.openxmlformats.org/officeDocument/2006/relationships" xmlns:p="http://schemas.openxmlformats.org/presentationml/2006/main">
   <p:cSld>
     <p:spTree>
@@ -4852,11 +5669,7 @@
           <a:p>
             <a:r>
               <a:rPr lang="en-US" sz="1600" dirty="0" smtClean="0"/>
-              <a:t>Output element – needed when you need calculation from tw</a:t>
-            </a:r>
-            <a:r>
-              <a:rPr lang="en-US" sz="1600" dirty="0" smtClean="0"/>
-              <a:t>o inputs to be summarized in to a label</a:t>
+              <a:t>Output element – needed when you need calculation from two inputs to be summarized in to a label</a:t>
             </a:r>
           </a:p>
           <a:p>
@@ -4948,7 +5761,7 @@
 </p:sld>
 </file>
 
-<file path=ppt/slides/slide7.xml><?xml version="1.0" encoding="utf-8"?>
+<file path=ppt/slides/slide8.xml><?xml version="1.0" encoding="utf-8"?>
 <p:sld xmlns:a="http://schemas.openxmlformats.org/drawingml/2006/main" xmlns:r="http://schemas.openxmlformats.org/officeDocument/2006/relationships" xmlns:p="http://schemas.openxmlformats.org/presentationml/2006/main">
   <p:cSld>
     <p:spTree>
@@ -5249,7 +6062,7 @@
 </p:sld>
 </file>
 
-<file path=ppt/slides/slide8.xml><?xml version="1.0" encoding="utf-8"?>
+<file path=ppt/slides/slide9.xml><?xml version="1.0" encoding="utf-8"?>
 <p:sld xmlns:a="http://schemas.openxmlformats.org/drawingml/2006/main" xmlns:r="http://schemas.openxmlformats.org/officeDocument/2006/relationships" xmlns:p="http://schemas.openxmlformats.org/presentationml/2006/main">
   <p:cSld>
     <p:spTree>
@@ -5722,160 +6535,6 @@
 </p:sld>
 </file>
 
-<file path=ppt/slides/slide9.xml><?xml version="1.0" encoding="utf-8"?>
-<p:sld xmlns:a="http://schemas.openxmlformats.org/drawingml/2006/main" xmlns:r="http://schemas.openxmlformats.org/officeDocument/2006/relationships" xmlns:p="http://schemas.openxmlformats.org/presentationml/2006/main">
-  <p:cSld>
-    <p:spTree>
-      <p:nvGrpSpPr>
-        <p:cNvPr id="1" name=""/>
-        <p:cNvGrpSpPr/>
-        <p:nvPr/>
-      </p:nvGrpSpPr>
-      <p:grpSpPr>
-        <a:xfrm>
-          <a:off x="0" y="0"/>
-          <a:ext cx="0" cy="0"/>
-          <a:chOff x="0" y="0"/>
-          <a:chExt cx="0" cy="0"/>
-        </a:xfrm>
-      </p:grpSpPr>
-      <p:sp>
-        <p:nvSpPr>
-          <p:cNvPr id="2" name="Title 1"/>
-          <p:cNvSpPr>
-            <a:spLocks noGrp="1"/>
-          </p:cNvSpPr>
-          <p:nvPr>
-            <p:ph type="title"/>
-          </p:nvPr>
-        </p:nvSpPr>
-        <p:spPr/>
-        <p:txBody>
-          <a:bodyPr/>
-          <a:lstStyle/>
-          <a:p>
-            <a:r>
-              <a:rPr lang="en-US" dirty="0" smtClean="0"/>
-              <a:t>HTML5 – New API</a:t>
-            </a:r>
-            <a:endParaRPr lang="en-US" dirty="0"/>
-          </a:p>
-        </p:txBody>
-      </p:sp>
-      <p:sp>
-        <p:nvSpPr>
-          <p:cNvPr id="3" name="Content Placeholder 2"/>
-          <p:cNvSpPr>
-            <a:spLocks noGrp="1"/>
-          </p:cNvSpPr>
-          <p:nvPr>
-            <p:ph idx="1"/>
-          </p:nvPr>
-        </p:nvSpPr>
-        <p:spPr/>
-        <p:txBody>
-          <a:bodyPr>
-            <a:normAutofit/>
-          </a:bodyPr>
-          <a:lstStyle/>
-          <a:p>
-            <a:r>
-              <a:rPr lang="en-GB" sz="1600" dirty="0" smtClean="0"/>
-              <a:t>HTML </a:t>
-            </a:r>
-            <a:r>
-              <a:rPr lang="en-GB" sz="1600" dirty="0"/>
-              <a:t>5 </a:t>
-            </a:r>
-            <a:r>
-              <a:rPr lang="en-GB" sz="1600" dirty="0" smtClean="0"/>
-              <a:t>new APIs are:</a:t>
-            </a:r>
-          </a:p>
-          <a:p>
-            <a:pPr lvl="1"/>
-            <a:r>
-              <a:rPr lang="en-US" sz="1400" dirty="0" smtClean="0"/>
-              <a:t>Media API</a:t>
-            </a:r>
-          </a:p>
-          <a:p>
-            <a:pPr lvl="1"/>
-            <a:r>
-              <a:rPr lang="en-US" sz="1400" dirty="0" smtClean="0"/>
-              <a:t>Text Track API</a:t>
-            </a:r>
-          </a:p>
-          <a:p>
-            <a:pPr lvl="1"/>
-            <a:r>
-              <a:rPr lang="en-US" sz="1400" dirty="0" smtClean="0"/>
-              <a:t>Application Cache API</a:t>
-            </a:r>
-          </a:p>
-          <a:p>
-            <a:pPr lvl="1"/>
-            <a:r>
-              <a:rPr lang="en-US" sz="1400" dirty="0" smtClean="0"/>
-              <a:t>User Interaction</a:t>
-            </a:r>
-          </a:p>
-          <a:p>
-            <a:pPr lvl="1"/>
-            <a:r>
-              <a:rPr lang="en-US" sz="1400" dirty="0" smtClean="0"/>
-              <a:t>Data Transfer API</a:t>
-            </a:r>
-            <a:endParaRPr lang="en-US" sz="1400" dirty="0" smtClean="0"/>
-          </a:p>
-          <a:p>
-            <a:pPr lvl="1"/>
-            <a:r>
-              <a:rPr lang="en-US" sz="1400" dirty="0" smtClean="0"/>
-              <a:t>Command API</a:t>
-            </a:r>
-          </a:p>
-          <a:p>
-            <a:pPr lvl="1"/>
-            <a:r>
-              <a:rPr lang="en-US" sz="1400" dirty="0" smtClean="0"/>
-              <a:t>Constraint Validation API</a:t>
-            </a:r>
-          </a:p>
-          <a:p>
-            <a:pPr lvl="1"/>
-            <a:r>
-              <a:rPr lang="en-US" sz="1400" dirty="0" smtClean="0"/>
-              <a:t>History API</a:t>
-            </a:r>
-            <a:endParaRPr lang="en-US" sz="1400" dirty="0" smtClean="0"/>
-          </a:p>
-          <a:p>
-            <a:pPr lvl="1"/>
-            <a:endParaRPr lang="en-US" sz="1200" dirty="0" smtClean="0"/>
-          </a:p>
-        </p:txBody>
-      </p:sp>
-    </p:spTree>
-    <p:extLst>
-      <p:ext uri="{BB962C8B-B14F-4D97-AF65-F5344CB8AC3E}">
-        <p14:creationId xmlns:p14="http://schemas.microsoft.com/office/powerpoint/2010/main" val="664375382"/>
-      </p:ext>
-    </p:extLst>
-  </p:cSld>
-  <p:clrMapOvr>
-    <a:masterClrMapping/>
-  </p:clrMapOvr>
-  <p:timing>
-    <p:tnLst>
-      <p:par>
-        <p:cTn id="1" dur="indefinite" restart="never" nodeType="tmRoot"/>
-      </p:par>
-    </p:tnLst>
-  </p:timing>
-</p:sld>
-</file>
-
 <file path=ppt/theme/theme1.xml><?xml version="1.0" encoding="utf-8"?>
 <a:theme xmlns:a="http://schemas.openxmlformats.org/drawingml/2006/main" name="Clarity">
   <a:themeElements>

</xml_diff>